<commit_message>
Add ActiveX control tests
Change-Id: I26e5ea3a5c3711139d88476b435a3a0b50dd9cb3
Reviewed-on: https://gerrit.libreoffice.org/41074
Tested-by: Jenkins <ci@libreoffice.org>
Reviewed-by: Tamás Zolnai <tamas.zolnai@collabora.com>
</commit_message>
<xml_diff>
--- a/sd/qa/unit/data/pptx/activex_checkbox.pptx
+++ b/sd/qa/unit/data/pptx/activex_checkbox.pptx
@@ -107,11 +107,15 @@
 </p:presentation>
 </file>
 
-<file path=ppt/revisionInfo.xml><?xml version="1.0" encoding="utf-8"?>
-<p1510:revInfo xmlns:a="http://schemas.openxmlformats.org/drawingml/2006/main" xmlns:r="http://schemas.openxmlformats.org/officeDocument/2006/relationships" xmlns:p1510="http://schemas.microsoft.com/office/powerpoint/2015/10/main"/>
+<file path=ppt/activeX/activeX1.xml><?xml version="1.0" encoding="utf-8"?>
+<ax:ocx xmlns:ax="http://schemas.microsoft.com/office/2006/activeX" xmlns:r="http://schemas.openxmlformats.org/officeDocument/2006/relationships" ax:classid="{8BD21D40-EC42-11CE-9E0D-00AA006002F3}" ax:persistence="persistStorage" r:id="rId1"/>
 </file>
 
-<file path=ppt/activeX/activeX1.xml><?xml version="1.0" encoding="utf-8"?>
+<file path=ppt/activeX/activeX2.xml><?xml version="1.0" encoding="utf-8"?>
+<ax:ocx xmlns:ax="http://schemas.microsoft.com/office/2006/activeX" xmlns:r="http://schemas.openxmlformats.org/officeDocument/2006/relationships" ax:classid="{8BD21D40-EC42-11CE-9E0D-00AA006002F3}" ax:persistence="persistStorage" r:id="rId1"/>
+</file>
+
+<file path=ppt/activeX/activeX3.xml><?xml version="1.0" encoding="utf-8"?>
 <ax:ocx xmlns:ax="http://schemas.microsoft.com/office/2006/activeX" xmlns:r="http://schemas.openxmlformats.org/officeDocument/2006/relationships" ax:classid="{8BD21D40-EC42-11CE-9E0D-00AA006002F3}" ax:persistence="persistStorage" r:id="rId1"/>
 </file>
 
@@ -137,7 +141,7 @@
           <p:cNvPr id="2" name="Title 1">
             <a:extLst>
               <a:ext uri="{FF2B5EF4-FFF2-40B4-BE49-F238E27FC236}">
-                <a16:creationId xmlns:a16="http://schemas.microsoft.com/office/drawing/2014/main" id="{1F12ADDF-951F-46AA-A3E7-2584F0ED8679}"/>
+                <a16:creationId xmlns:a16="http://schemas.microsoft.com/office/drawing/2014/main" id="{97AED92D-6369-4156-8712-0954567103F2}"/>
               </a:ext>
             </a:extLst>
           </p:cNvPr>
@@ -175,7 +179,7 @@
           <p:cNvPr id="3" name="Subtitle 2">
             <a:extLst>
               <a:ext uri="{FF2B5EF4-FFF2-40B4-BE49-F238E27FC236}">
-                <a16:creationId xmlns:a16="http://schemas.microsoft.com/office/drawing/2014/main" id="{DD0CF11D-7BC4-438B-A470-BCA21FBA25C3}"/>
+                <a16:creationId xmlns:a16="http://schemas.microsoft.com/office/drawing/2014/main" id="{2A1867E9-D54A-4940-82FD-EEF7E1247D67}"/>
               </a:ext>
             </a:extLst>
           </p:cNvPr>
@@ -246,7 +250,7 @@
           <p:cNvPr id="4" name="Date Placeholder 3">
             <a:extLst>
               <a:ext uri="{FF2B5EF4-FFF2-40B4-BE49-F238E27FC236}">
-                <a16:creationId xmlns:a16="http://schemas.microsoft.com/office/drawing/2014/main" id="{0D7D4F7C-442F-4B4D-A4F3-7B8AA8179157}"/>
+                <a16:creationId xmlns:a16="http://schemas.microsoft.com/office/drawing/2014/main" id="{21D6B277-7D42-4C08-B02C-ABB8E30B67A8}"/>
               </a:ext>
             </a:extLst>
           </p:cNvPr>
@@ -262,9 +266,9 @@
           <a:bodyPr/>
           <a:lstStyle/>
           <a:p>
-            <a:fld id="{E4D7F0DB-FBA8-467D-BC26-345BCD8F00EC}" type="datetimeFigureOut">
+            <a:fld id="{4880C7B9-F6E0-4938-B097-2C8B5620FE66}" type="datetimeFigureOut">
               <a:rPr lang="hu-HU" smtClean="0"/>
-              <a:t>2017.08.03.</a:t>
+              <a:t>2017.08.07.</a:t>
             </a:fld>
             <a:endParaRPr lang="hu-HU"/>
           </a:p>
@@ -275,7 +279,7 @@
           <p:cNvPr id="5" name="Footer Placeholder 4">
             <a:extLst>
               <a:ext uri="{FF2B5EF4-FFF2-40B4-BE49-F238E27FC236}">
-                <a16:creationId xmlns:a16="http://schemas.microsoft.com/office/drawing/2014/main" id="{81EE1C62-BB29-47ED-A883-6D5507025D9A}"/>
+                <a16:creationId xmlns:a16="http://schemas.microsoft.com/office/drawing/2014/main" id="{393677B4-8F89-447A-95D3-EBA8F7BD5E36}"/>
               </a:ext>
             </a:extLst>
           </p:cNvPr>
@@ -300,7 +304,7 @@
           <p:cNvPr id="6" name="Slide Number Placeholder 5">
             <a:extLst>
               <a:ext uri="{FF2B5EF4-FFF2-40B4-BE49-F238E27FC236}">
-                <a16:creationId xmlns:a16="http://schemas.microsoft.com/office/drawing/2014/main" id="{01F43239-7007-45EC-961A-68E092288E6D}"/>
+                <a16:creationId xmlns:a16="http://schemas.microsoft.com/office/drawing/2014/main" id="{C9C4E5DF-AD17-4258-89A9-CD2D55234259}"/>
               </a:ext>
             </a:extLst>
           </p:cNvPr>
@@ -316,7 +320,7 @@
           <a:bodyPr/>
           <a:lstStyle/>
           <a:p>
-            <a:fld id="{68EB2A7A-4083-4E15-8773-25D9DE2EC004}" type="slidenum">
+            <a:fld id="{96F39F47-D75B-476C-BE19-C7475061343E}" type="slidenum">
               <a:rPr lang="hu-HU" smtClean="0"/>
               <a:t>‹#›</a:t>
             </a:fld>
@@ -327,7 +331,7 @@
     </p:spTree>
     <p:extLst>
       <p:ext uri="{BB962C8B-B14F-4D97-AF65-F5344CB8AC3E}">
-        <p14:creationId xmlns:p14="http://schemas.microsoft.com/office/powerpoint/2010/main" val="2411786121"/>
+        <p14:creationId xmlns:p14="http://schemas.microsoft.com/office/powerpoint/2010/main" val="3106518163"/>
       </p:ext>
     </p:extLst>
   </p:cSld>
@@ -359,7 +363,7 @@
           <p:cNvPr id="2" name="Title 1">
             <a:extLst>
               <a:ext uri="{FF2B5EF4-FFF2-40B4-BE49-F238E27FC236}">
-                <a16:creationId xmlns:a16="http://schemas.microsoft.com/office/drawing/2014/main" id="{33DF995B-8278-423B-99C9-BD435D058E3A}"/>
+                <a16:creationId xmlns:a16="http://schemas.microsoft.com/office/drawing/2014/main" id="{EB1F64C8-910E-4B20-A10F-5B3D81B87FFE}"/>
               </a:ext>
             </a:extLst>
           </p:cNvPr>
@@ -388,7 +392,7 @@
           <p:cNvPr id="3" name="Vertical Text Placeholder 2">
             <a:extLst>
               <a:ext uri="{FF2B5EF4-FFF2-40B4-BE49-F238E27FC236}">
-                <a16:creationId xmlns:a16="http://schemas.microsoft.com/office/drawing/2014/main" id="{3733AF0F-A0E0-4BB2-9582-1586DA929F2B}"/>
+                <a16:creationId xmlns:a16="http://schemas.microsoft.com/office/drawing/2014/main" id="{A55E03D5-8300-4FFD-A0D3-BC4F0F906D81}"/>
               </a:ext>
             </a:extLst>
           </p:cNvPr>
@@ -446,7 +450,7 @@
           <p:cNvPr id="4" name="Date Placeholder 3">
             <a:extLst>
               <a:ext uri="{FF2B5EF4-FFF2-40B4-BE49-F238E27FC236}">
-                <a16:creationId xmlns:a16="http://schemas.microsoft.com/office/drawing/2014/main" id="{991FABA7-F5BA-4BD0-A94C-96DFCC5B9E74}"/>
+                <a16:creationId xmlns:a16="http://schemas.microsoft.com/office/drawing/2014/main" id="{58960ECC-BF49-42E5-85F5-CC66FA20E8CD}"/>
               </a:ext>
             </a:extLst>
           </p:cNvPr>
@@ -462,9 +466,9 @@
           <a:bodyPr/>
           <a:lstStyle/>
           <a:p>
-            <a:fld id="{E4D7F0DB-FBA8-467D-BC26-345BCD8F00EC}" type="datetimeFigureOut">
+            <a:fld id="{4880C7B9-F6E0-4938-B097-2C8B5620FE66}" type="datetimeFigureOut">
               <a:rPr lang="hu-HU" smtClean="0"/>
-              <a:t>2017.08.03.</a:t>
+              <a:t>2017.08.07.</a:t>
             </a:fld>
             <a:endParaRPr lang="hu-HU"/>
           </a:p>
@@ -475,7 +479,7 @@
           <p:cNvPr id="5" name="Footer Placeholder 4">
             <a:extLst>
               <a:ext uri="{FF2B5EF4-FFF2-40B4-BE49-F238E27FC236}">
-                <a16:creationId xmlns:a16="http://schemas.microsoft.com/office/drawing/2014/main" id="{2695D983-FCCD-48C2-BC15-C903C1CEBD4A}"/>
+                <a16:creationId xmlns:a16="http://schemas.microsoft.com/office/drawing/2014/main" id="{5FA85BB6-CC5A-47FB-829E-56468C9978C7}"/>
               </a:ext>
             </a:extLst>
           </p:cNvPr>
@@ -500,7 +504,7 @@
           <p:cNvPr id="6" name="Slide Number Placeholder 5">
             <a:extLst>
               <a:ext uri="{FF2B5EF4-FFF2-40B4-BE49-F238E27FC236}">
-                <a16:creationId xmlns:a16="http://schemas.microsoft.com/office/drawing/2014/main" id="{4CE990D2-8982-4AC8-AC2A-A905C54483D0}"/>
+                <a16:creationId xmlns:a16="http://schemas.microsoft.com/office/drawing/2014/main" id="{32A1C380-A366-4CFA-BBC7-5DED4BAAB482}"/>
               </a:ext>
             </a:extLst>
           </p:cNvPr>
@@ -516,7 +520,7 @@
           <a:bodyPr/>
           <a:lstStyle/>
           <a:p>
-            <a:fld id="{68EB2A7A-4083-4E15-8773-25D9DE2EC004}" type="slidenum">
+            <a:fld id="{96F39F47-D75B-476C-BE19-C7475061343E}" type="slidenum">
               <a:rPr lang="hu-HU" smtClean="0"/>
               <a:t>‹#›</a:t>
             </a:fld>
@@ -527,7 +531,7 @@
     </p:spTree>
     <p:extLst>
       <p:ext uri="{BB962C8B-B14F-4D97-AF65-F5344CB8AC3E}">
-        <p14:creationId xmlns:p14="http://schemas.microsoft.com/office/powerpoint/2010/main" val="1011269652"/>
+        <p14:creationId xmlns:p14="http://schemas.microsoft.com/office/powerpoint/2010/main" val="475681729"/>
       </p:ext>
     </p:extLst>
   </p:cSld>
@@ -559,7 +563,7 @@
           <p:cNvPr id="2" name="Vertical Title 1">
             <a:extLst>
               <a:ext uri="{FF2B5EF4-FFF2-40B4-BE49-F238E27FC236}">
-                <a16:creationId xmlns:a16="http://schemas.microsoft.com/office/drawing/2014/main" id="{0865FA30-BF22-4E63-81B2-C55140BDDC03}"/>
+                <a16:creationId xmlns:a16="http://schemas.microsoft.com/office/drawing/2014/main" id="{3EBF90F1-9D40-4E8C-B652-68BF50E8966B}"/>
               </a:ext>
             </a:extLst>
           </p:cNvPr>
@@ -593,7 +597,7 @@
           <p:cNvPr id="3" name="Vertical Text Placeholder 2">
             <a:extLst>
               <a:ext uri="{FF2B5EF4-FFF2-40B4-BE49-F238E27FC236}">
-                <a16:creationId xmlns:a16="http://schemas.microsoft.com/office/drawing/2014/main" id="{5B03A50F-205C-446B-A898-FA3B28D26C43}"/>
+                <a16:creationId xmlns:a16="http://schemas.microsoft.com/office/drawing/2014/main" id="{06DC4F2D-EF91-4982-B21C-48373D540DCD}"/>
               </a:ext>
             </a:extLst>
           </p:cNvPr>
@@ -656,7 +660,7 @@
           <p:cNvPr id="4" name="Date Placeholder 3">
             <a:extLst>
               <a:ext uri="{FF2B5EF4-FFF2-40B4-BE49-F238E27FC236}">
-                <a16:creationId xmlns:a16="http://schemas.microsoft.com/office/drawing/2014/main" id="{C0813D0D-A5EF-40D5-A190-71FD155187EE}"/>
+                <a16:creationId xmlns:a16="http://schemas.microsoft.com/office/drawing/2014/main" id="{A936B1BD-8A0F-4316-85AA-FACF59DFF569}"/>
               </a:ext>
             </a:extLst>
           </p:cNvPr>
@@ -672,9 +676,9 @@
           <a:bodyPr/>
           <a:lstStyle/>
           <a:p>
-            <a:fld id="{E4D7F0DB-FBA8-467D-BC26-345BCD8F00EC}" type="datetimeFigureOut">
+            <a:fld id="{4880C7B9-F6E0-4938-B097-2C8B5620FE66}" type="datetimeFigureOut">
               <a:rPr lang="hu-HU" smtClean="0"/>
-              <a:t>2017.08.03.</a:t>
+              <a:t>2017.08.07.</a:t>
             </a:fld>
             <a:endParaRPr lang="hu-HU"/>
           </a:p>
@@ -685,7 +689,7 @@
           <p:cNvPr id="5" name="Footer Placeholder 4">
             <a:extLst>
               <a:ext uri="{FF2B5EF4-FFF2-40B4-BE49-F238E27FC236}">
-                <a16:creationId xmlns:a16="http://schemas.microsoft.com/office/drawing/2014/main" id="{38436C68-DB7A-4EC3-B2A2-E4173EF6CC0F}"/>
+                <a16:creationId xmlns:a16="http://schemas.microsoft.com/office/drawing/2014/main" id="{79A7F962-3052-44F8-99BD-1A460B72632B}"/>
               </a:ext>
             </a:extLst>
           </p:cNvPr>
@@ -710,7 +714,7 @@
           <p:cNvPr id="6" name="Slide Number Placeholder 5">
             <a:extLst>
               <a:ext uri="{FF2B5EF4-FFF2-40B4-BE49-F238E27FC236}">
-                <a16:creationId xmlns:a16="http://schemas.microsoft.com/office/drawing/2014/main" id="{3BC44F3C-4B99-4815-8985-3C6C30C86609}"/>
+                <a16:creationId xmlns:a16="http://schemas.microsoft.com/office/drawing/2014/main" id="{B2B0F04D-5931-4874-97E8-73B8AC74F8B5}"/>
               </a:ext>
             </a:extLst>
           </p:cNvPr>
@@ -726,7 +730,7 @@
           <a:bodyPr/>
           <a:lstStyle/>
           <a:p>
-            <a:fld id="{68EB2A7A-4083-4E15-8773-25D9DE2EC004}" type="slidenum">
+            <a:fld id="{96F39F47-D75B-476C-BE19-C7475061343E}" type="slidenum">
               <a:rPr lang="hu-HU" smtClean="0"/>
               <a:t>‹#›</a:t>
             </a:fld>
@@ -737,7 +741,7 @@
     </p:spTree>
     <p:extLst>
       <p:ext uri="{BB962C8B-B14F-4D97-AF65-F5344CB8AC3E}">
-        <p14:creationId xmlns:p14="http://schemas.microsoft.com/office/powerpoint/2010/main" val="2632576039"/>
+        <p14:creationId xmlns:p14="http://schemas.microsoft.com/office/powerpoint/2010/main" val="962448114"/>
       </p:ext>
     </p:extLst>
   </p:cSld>
@@ -769,7 +773,7 @@
           <p:cNvPr id="2" name="Title 1">
             <a:extLst>
               <a:ext uri="{FF2B5EF4-FFF2-40B4-BE49-F238E27FC236}">
-                <a16:creationId xmlns:a16="http://schemas.microsoft.com/office/drawing/2014/main" id="{09819418-E6E9-4FE9-BD5F-8DE804BDE4D3}"/>
+                <a16:creationId xmlns:a16="http://schemas.microsoft.com/office/drawing/2014/main" id="{73258356-D0AD-465E-955D-2662BA2CA490}"/>
               </a:ext>
             </a:extLst>
           </p:cNvPr>
@@ -798,7 +802,7 @@
           <p:cNvPr id="3" name="Content Placeholder 2">
             <a:extLst>
               <a:ext uri="{FF2B5EF4-FFF2-40B4-BE49-F238E27FC236}">
-                <a16:creationId xmlns:a16="http://schemas.microsoft.com/office/drawing/2014/main" id="{5350C8A2-F1E3-46C4-9841-7A20F6383589}"/>
+                <a16:creationId xmlns:a16="http://schemas.microsoft.com/office/drawing/2014/main" id="{8AB99E3C-AEF5-47F4-AAD0-36AFCD709AB1}"/>
               </a:ext>
             </a:extLst>
           </p:cNvPr>
@@ -856,7 +860,7 @@
           <p:cNvPr id="4" name="Date Placeholder 3">
             <a:extLst>
               <a:ext uri="{FF2B5EF4-FFF2-40B4-BE49-F238E27FC236}">
-                <a16:creationId xmlns:a16="http://schemas.microsoft.com/office/drawing/2014/main" id="{33FD0481-22B0-4318-B0DD-11A4A2DBD7AD}"/>
+                <a16:creationId xmlns:a16="http://schemas.microsoft.com/office/drawing/2014/main" id="{D5B77729-D59E-480F-B6B0-3FAAE01504DF}"/>
               </a:ext>
             </a:extLst>
           </p:cNvPr>
@@ -872,9 +876,9 @@
           <a:bodyPr/>
           <a:lstStyle/>
           <a:p>
-            <a:fld id="{E4D7F0DB-FBA8-467D-BC26-345BCD8F00EC}" type="datetimeFigureOut">
+            <a:fld id="{4880C7B9-F6E0-4938-B097-2C8B5620FE66}" type="datetimeFigureOut">
               <a:rPr lang="hu-HU" smtClean="0"/>
-              <a:t>2017.08.03.</a:t>
+              <a:t>2017.08.07.</a:t>
             </a:fld>
             <a:endParaRPr lang="hu-HU"/>
           </a:p>
@@ -885,7 +889,7 @@
           <p:cNvPr id="5" name="Footer Placeholder 4">
             <a:extLst>
               <a:ext uri="{FF2B5EF4-FFF2-40B4-BE49-F238E27FC236}">
-                <a16:creationId xmlns:a16="http://schemas.microsoft.com/office/drawing/2014/main" id="{7358CC0E-C5F4-489F-84E2-6B928954850D}"/>
+                <a16:creationId xmlns:a16="http://schemas.microsoft.com/office/drawing/2014/main" id="{18D78969-20AE-4905-A1FF-AC49FFBBDE79}"/>
               </a:ext>
             </a:extLst>
           </p:cNvPr>
@@ -910,7 +914,7 @@
           <p:cNvPr id="6" name="Slide Number Placeholder 5">
             <a:extLst>
               <a:ext uri="{FF2B5EF4-FFF2-40B4-BE49-F238E27FC236}">
-                <a16:creationId xmlns:a16="http://schemas.microsoft.com/office/drawing/2014/main" id="{6BF5D320-D254-41A0-8B40-FCAF3C805721}"/>
+                <a16:creationId xmlns:a16="http://schemas.microsoft.com/office/drawing/2014/main" id="{CAF51F6B-D973-4BA1-BF21-676D0E153F0E}"/>
               </a:ext>
             </a:extLst>
           </p:cNvPr>
@@ -926,7 +930,7 @@
           <a:bodyPr/>
           <a:lstStyle/>
           <a:p>
-            <a:fld id="{68EB2A7A-4083-4E15-8773-25D9DE2EC004}" type="slidenum">
+            <a:fld id="{96F39F47-D75B-476C-BE19-C7475061343E}" type="slidenum">
               <a:rPr lang="hu-HU" smtClean="0"/>
               <a:t>‹#›</a:t>
             </a:fld>
@@ -937,7 +941,7 @@
     </p:spTree>
     <p:extLst>
       <p:ext uri="{BB962C8B-B14F-4D97-AF65-F5344CB8AC3E}">
-        <p14:creationId xmlns:p14="http://schemas.microsoft.com/office/powerpoint/2010/main" val="3697402297"/>
+        <p14:creationId xmlns:p14="http://schemas.microsoft.com/office/powerpoint/2010/main" val="890535603"/>
       </p:ext>
     </p:extLst>
   </p:cSld>
@@ -969,7 +973,7 @@
           <p:cNvPr id="2" name="Title 1">
             <a:extLst>
               <a:ext uri="{FF2B5EF4-FFF2-40B4-BE49-F238E27FC236}">
-                <a16:creationId xmlns:a16="http://schemas.microsoft.com/office/drawing/2014/main" id="{A5F866D3-CD3B-4677-8D6E-763FDC813A28}"/>
+                <a16:creationId xmlns:a16="http://schemas.microsoft.com/office/drawing/2014/main" id="{6BBBEBF3-98BD-4C58-BD78-BC7B56D0EE78}"/>
               </a:ext>
             </a:extLst>
           </p:cNvPr>
@@ -1007,7 +1011,7 @@
           <p:cNvPr id="3" name="Text Placeholder 2">
             <a:extLst>
               <a:ext uri="{FF2B5EF4-FFF2-40B4-BE49-F238E27FC236}">
-                <a16:creationId xmlns:a16="http://schemas.microsoft.com/office/drawing/2014/main" id="{66512948-9C53-426C-8FFA-F22FDB4E783B}"/>
+                <a16:creationId xmlns:a16="http://schemas.microsoft.com/office/drawing/2014/main" id="{DF266F98-A4E6-42F4-B63A-205146B16272}"/>
               </a:ext>
             </a:extLst>
           </p:cNvPr>
@@ -1132,7 +1136,7 @@
           <p:cNvPr id="4" name="Date Placeholder 3">
             <a:extLst>
               <a:ext uri="{FF2B5EF4-FFF2-40B4-BE49-F238E27FC236}">
-                <a16:creationId xmlns:a16="http://schemas.microsoft.com/office/drawing/2014/main" id="{811228F0-3425-4A99-8888-58276F23C29A}"/>
+                <a16:creationId xmlns:a16="http://schemas.microsoft.com/office/drawing/2014/main" id="{E097047D-0AA2-41B7-8064-EB9ED477E15A}"/>
               </a:ext>
             </a:extLst>
           </p:cNvPr>
@@ -1148,9 +1152,9 @@
           <a:bodyPr/>
           <a:lstStyle/>
           <a:p>
-            <a:fld id="{E4D7F0DB-FBA8-467D-BC26-345BCD8F00EC}" type="datetimeFigureOut">
+            <a:fld id="{4880C7B9-F6E0-4938-B097-2C8B5620FE66}" type="datetimeFigureOut">
               <a:rPr lang="hu-HU" smtClean="0"/>
-              <a:t>2017.08.03.</a:t>
+              <a:t>2017.08.07.</a:t>
             </a:fld>
             <a:endParaRPr lang="hu-HU"/>
           </a:p>
@@ -1161,7 +1165,7 @@
           <p:cNvPr id="5" name="Footer Placeholder 4">
             <a:extLst>
               <a:ext uri="{FF2B5EF4-FFF2-40B4-BE49-F238E27FC236}">
-                <a16:creationId xmlns:a16="http://schemas.microsoft.com/office/drawing/2014/main" id="{FB74803A-3EE6-4837-896B-0F1C7B8F0043}"/>
+                <a16:creationId xmlns:a16="http://schemas.microsoft.com/office/drawing/2014/main" id="{94061613-C9F0-46A1-9282-89EB34925B07}"/>
               </a:ext>
             </a:extLst>
           </p:cNvPr>
@@ -1186,7 +1190,7 @@
           <p:cNvPr id="6" name="Slide Number Placeholder 5">
             <a:extLst>
               <a:ext uri="{FF2B5EF4-FFF2-40B4-BE49-F238E27FC236}">
-                <a16:creationId xmlns:a16="http://schemas.microsoft.com/office/drawing/2014/main" id="{037A9AF7-0B6D-4284-8D6B-A574CA46467E}"/>
+                <a16:creationId xmlns:a16="http://schemas.microsoft.com/office/drawing/2014/main" id="{C1F8C5F4-755F-4E7A-B5B4-8157443EAC8E}"/>
               </a:ext>
             </a:extLst>
           </p:cNvPr>
@@ -1202,7 +1206,7 @@
           <a:bodyPr/>
           <a:lstStyle/>
           <a:p>
-            <a:fld id="{68EB2A7A-4083-4E15-8773-25D9DE2EC004}" type="slidenum">
+            <a:fld id="{96F39F47-D75B-476C-BE19-C7475061343E}" type="slidenum">
               <a:rPr lang="hu-HU" smtClean="0"/>
               <a:t>‹#›</a:t>
             </a:fld>
@@ -1213,7 +1217,7 @@
     </p:spTree>
     <p:extLst>
       <p:ext uri="{BB962C8B-B14F-4D97-AF65-F5344CB8AC3E}">
-        <p14:creationId xmlns:p14="http://schemas.microsoft.com/office/powerpoint/2010/main" val="2730278954"/>
+        <p14:creationId xmlns:p14="http://schemas.microsoft.com/office/powerpoint/2010/main" val="685925900"/>
       </p:ext>
     </p:extLst>
   </p:cSld>
@@ -1245,7 +1249,7 @@
           <p:cNvPr id="2" name="Title 1">
             <a:extLst>
               <a:ext uri="{FF2B5EF4-FFF2-40B4-BE49-F238E27FC236}">
-                <a16:creationId xmlns:a16="http://schemas.microsoft.com/office/drawing/2014/main" id="{FDBCC031-4E0B-4FF1-BA3A-65D9807C654B}"/>
+                <a16:creationId xmlns:a16="http://schemas.microsoft.com/office/drawing/2014/main" id="{3E744C47-400C-46A2-8EFD-75B4215F6DC2}"/>
               </a:ext>
             </a:extLst>
           </p:cNvPr>
@@ -1274,7 +1278,7 @@
           <p:cNvPr id="3" name="Content Placeholder 2">
             <a:extLst>
               <a:ext uri="{FF2B5EF4-FFF2-40B4-BE49-F238E27FC236}">
-                <a16:creationId xmlns:a16="http://schemas.microsoft.com/office/drawing/2014/main" id="{0A97A449-A65A-4321-9484-B1A50150135A}"/>
+                <a16:creationId xmlns:a16="http://schemas.microsoft.com/office/drawing/2014/main" id="{30D48B88-4273-4AA7-8FD3-B0A202A1821E}"/>
               </a:ext>
             </a:extLst>
           </p:cNvPr>
@@ -1337,7 +1341,7 @@
           <p:cNvPr id="4" name="Content Placeholder 3">
             <a:extLst>
               <a:ext uri="{FF2B5EF4-FFF2-40B4-BE49-F238E27FC236}">
-                <a16:creationId xmlns:a16="http://schemas.microsoft.com/office/drawing/2014/main" id="{604F5D5C-7611-40F2-A684-8AFA201DDE85}"/>
+                <a16:creationId xmlns:a16="http://schemas.microsoft.com/office/drawing/2014/main" id="{12B9D7AD-91C3-404B-86FE-ADDF7995CB88}"/>
               </a:ext>
             </a:extLst>
           </p:cNvPr>
@@ -1400,7 +1404,7 @@
           <p:cNvPr id="5" name="Date Placeholder 4">
             <a:extLst>
               <a:ext uri="{FF2B5EF4-FFF2-40B4-BE49-F238E27FC236}">
-                <a16:creationId xmlns:a16="http://schemas.microsoft.com/office/drawing/2014/main" id="{562BC584-611B-4EA9-95F9-D77F332DE1AC}"/>
+                <a16:creationId xmlns:a16="http://schemas.microsoft.com/office/drawing/2014/main" id="{8582B3FF-D5D9-425E-8973-284D7E2FE48A}"/>
               </a:ext>
             </a:extLst>
           </p:cNvPr>
@@ -1416,9 +1420,9 @@
           <a:bodyPr/>
           <a:lstStyle/>
           <a:p>
-            <a:fld id="{E4D7F0DB-FBA8-467D-BC26-345BCD8F00EC}" type="datetimeFigureOut">
+            <a:fld id="{4880C7B9-F6E0-4938-B097-2C8B5620FE66}" type="datetimeFigureOut">
               <a:rPr lang="hu-HU" smtClean="0"/>
-              <a:t>2017.08.03.</a:t>
+              <a:t>2017.08.07.</a:t>
             </a:fld>
             <a:endParaRPr lang="hu-HU"/>
           </a:p>
@@ -1429,7 +1433,7 @@
           <p:cNvPr id="6" name="Footer Placeholder 5">
             <a:extLst>
               <a:ext uri="{FF2B5EF4-FFF2-40B4-BE49-F238E27FC236}">
-                <a16:creationId xmlns:a16="http://schemas.microsoft.com/office/drawing/2014/main" id="{9C3EF7F9-4E4D-477A-BC7E-15036FFC7A54}"/>
+                <a16:creationId xmlns:a16="http://schemas.microsoft.com/office/drawing/2014/main" id="{7E916C31-42C1-4DD0-A02F-BE52F4CD685E}"/>
               </a:ext>
             </a:extLst>
           </p:cNvPr>
@@ -1454,7 +1458,7 @@
           <p:cNvPr id="7" name="Slide Number Placeholder 6">
             <a:extLst>
               <a:ext uri="{FF2B5EF4-FFF2-40B4-BE49-F238E27FC236}">
-                <a16:creationId xmlns:a16="http://schemas.microsoft.com/office/drawing/2014/main" id="{4557C2EB-0566-475A-8098-ECA76D574915}"/>
+                <a16:creationId xmlns:a16="http://schemas.microsoft.com/office/drawing/2014/main" id="{7F2360C5-625A-4915-A249-96D03A8CD968}"/>
               </a:ext>
             </a:extLst>
           </p:cNvPr>
@@ -1470,7 +1474,7 @@
           <a:bodyPr/>
           <a:lstStyle/>
           <a:p>
-            <a:fld id="{68EB2A7A-4083-4E15-8773-25D9DE2EC004}" type="slidenum">
+            <a:fld id="{96F39F47-D75B-476C-BE19-C7475061343E}" type="slidenum">
               <a:rPr lang="hu-HU" smtClean="0"/>
               <a:t>‹#›</a:t>
             </a:fld>
@@ -1481,7 +1485,7 @@
     </p:spTree>
     <p:extLst>
       <p:ext uri="{BB962C8B-B14F-4D97-AF65-F5344CB8AC3E}">
-        <p14:creationId xmlns:p14="http://schemas.microsoft.com/office/powerpoint/2010/main" val="416902431"/>
+        <p14:creationId xmlns:p14="http://schemas.microsoft.com/office/powerpoint/2010/main" val="1214970891"/>
       </p:ext>
     </p:extLst>
   </p:cSld>
@@ -1513,7 +1517,7 @@
           <p:cNvPr id="2" name="Title 1">
             <a:extLst>
               <a:ext uri="{FF2B5EF4-FFF2-40B4-BE49-F238E27FC236}">
-                <a16:creationId xmlns:a16="http://schemas.microsoft.com/office/drawing/2014/main" id="{CC3B53BD-1AA5-4A97-8D8D-AC6FF90F540D}"/>
+                <a16:creationId xmlns:a16="http://schemas.microsoft.com/office/drawing/2014/main" id="{A5DECBB7-88A8-490B-97C1-5F31AFDFF0BD}"/>
               </a:ext>
             </a:extLst>
           </p:cNvPr>
@@ -1547,7 +1551,7 @@
           <p:cNvPr id="3" name="Text Placeholder 2">
             <a:extLst>
               <a:ext uri="{FF2B5EF4-FFF2-40B4-BE49-F238E27FC236}">
-                <a16:creationId xmlns:a16="http://schemas.microsoft.com/office/drawing/2014/main" id="{0A731CE2-0EA3-48F8-8CD3-0238CDB952A3}"/>
+                <a16:creationId xmlns:a16="http://schemas.microsoft.com/office/drawing/2014/main" id="{EDA004CC-B90A-41EA-8D55-629CDB7618BC}"/>
               </a:ext>
             </a:extLst>
           </p:cNvPr>
@@ -1618,7 +1622,7 @@
           <p:cNvPr id="4" name="Content Placeholder 3">
             <a:extLst>
               <a:ext uri="{FF2B5EF4-FFF2-40B4-BE49-F238E27FC236}">
-                <a16:creationId xmlns:a16="http://schemas.microsoft.com/office/drawing/2014/main" id="{820B0F77-E263-4EE2-9356-E0F218F96C46}"/>
+                <a16:creationId xmlns:a16="http://schemas.microsoft.com/office/drawing/2014/main" id="{40CF013C-D3F2-4CE7-80D1-4E6CC6313973}"/>
               </a:ext>
             </a:extLst>
           </p:cNvPr>
@@ -1681,7 +1685,7 @@
           <p:cNvPr id="5" name="Text Placeholder 4">
             <a:extLst>
               <a:ext uri="{FF2B5EF4-FFF2-40B4-BE49-F238E27FC236}">
-                <a16:creationId xmlns:a16="http://schemas.microsoft.com/office/drawing/2014/main" id="{92FEBA09-7F7F-4D3F-AA35-61A7BD07279F}"/>
+                <a16:creationId xmlns:a16="http://schemas.microsoft.com/office/drawing/2014/main" id="{A5339780-E3A4-475B-B0AC-84D9857CB4F7}"/>
               </a:ext>
             </a:extLst>
           </p:cNvPr>
@@ -1752,7 +1756,7 @@
           <p:cNvPr id="6" name="Content Placeholder 5">
             <a:extLst>
               <a:ext uri="{FF2B5EF4-FFF2-40B4-BE49-F238E27FC236}">
-                <a16:creationId xmlns:a16="http://schemas.microsoft.com/office/drawing/2014/main" id="{41FA6920-4B45-4A5C-B344-AF012F6673C8}"/>
+                <a16:creationId xmlns:a16="http://schemas.microsoft.com/office/drawing/2014/main" id="{81BFF301-926C-4B69-8905-4525448E340C}"/>
               </a:ext>
             </a:extLst>
           </p:cNvPr>
@@ -1815,7 +1819,7 @@
           <p:cNvPr id="7" name="Date Placeholder 6">
             <a:extLst>
               <a:ext uri="{FF2B5EF4-FFF2-40B4-BE49-F238E27FC236}">
-                <a16:creationId xmlns:a16="http://schemas.microsoft.com/office/drawing/2014/main" id="{634CC459-6F83-4210-AF63-40DA019F85DD}"/>
+                <a16:creationId xmlns:a16="http://schemas.microsoft.com/office/drawing/2014/main" id="{4ADE5C92-8FBF-478D-8015-CCC2B0C146C4}"/>
               </a:ext>
             </a:extLst>
           </p:cNvPr>
@@ -1831,9 +1835,9 @@
           <a:bodyPr/>
           <a:lstStyle/>
           <a:p>
-            <a:fld id="{E4D7F0DB-FBA8-467D-BC26-345BCD8F00EC}" type="datetimeFigureOut">
+            <a:fld id="{4880C7B9-F6E0-4938-B097-2C8B5620FE66}" type="datetimeFigureOut">
               <a:rPr lang="hu-HU" smtClean="0"/>
-              <a:t>2017.08.03.</a:t>
+              <a:t>2017.08.07.</a:t>
             </a:fld>
             <a:endParaRPr lang="hu-HU"/>
           </a:p>
@@ -1844,7 +1848,7 @@
           <p:cNvPr id="8" name="Footer Placeholder 7">
             <a:extLst>
               <a:ext uri="{FF2B5EF4-FFF2-40B4-BE49-F238E27FC236}">
-                <a16:creationId xmlns:a16="http://schemas.microsoft.com/office/drawing/2014/main" id="{8B535183-06B3-4D5B-BA20-5FCF575190D5}"/>
+                <a16:creationId xmlns:a16="http://schemas.microsoft.com/office/drawing/2014/main" id="{88478773-D265-4034-A729-6F4A323F0401}"/>
               </a:ext>
             </a:extLst>
           </p:cNvPr>
@@ -1869,7 +1873,7 @@
           <p:cNvPr id="9" name="Slide Number Placeholder 8">
             <a:extLst>
               <a:ext uri="{FF2B5EF4-FFF2-40B4-BE49-F238E27FC236}">
-                <a16:creationId xmlns:a16="http://schemas.microsoft.com/office/drawing/2014/main" id="{9050D19B-E46F-4079-94A5-EC4042E603A2}"/>
+                <a16:creationId xmlns:a16="http://schemas.microsoft.com/office/drawing/2014/main" id="{CCE0A707-D226-4700-B3EE-84D5B95C66F7}"/>
               </a:ext>
             </a:extLst>
           </p:cNvPr>
@@ -1885,7 +1889,7 @@
           <a:bodyPr/>
           <a:lstStyle/>
           <a:p>
-            <a:fld id="{68EB2A7A-4083-4E15-8773-25D9DE2EC004}" type="slidenum">
+            <a:fld id="{96F39F47-D75B-476C-BE19-C7475061343E}" type="slidenum">
               <a:rPr lang="hu-HU" smtClean="0"/>
               <a:t>‹#›</a:t>
             </a:fld>
@@ -1896,7 +1900,7 @@
     </p:spTree>
     <p:extLst>
       <p:ext uri="{BB962C8B-B14F-4D97-AF65-F5344CB8AC3E}">
-        <p14:creationId xmlns:p14="http://schemas.microsoft.com/office/powerpoint/2010/main" val="3594206494"/>
+        <p14:creationId xmlns:p14="http://schemas.microsoft.com/office/powerpoint/2010/main" val="1744541373"/>
       </p:ext>
     </p:extLst>
   </p:cSld>
@@ -1928,7 +1932,7 @@
           <p:cNvPr id="2" name="Title 1">
             <a:extLst>
               <a:ext uri="{FF2B5EF4-FFF2-40B4-BE49-F238E27FC236}">
-                <a16:creationId xmlns:a16="http://schemas.microsoft.com/office/drawing/2014/main" id="{5BE6185A-5C15-48BA-BA16-16E415E5148A}"/>
+                <a16:creationId xmlns:a16="http://schemas.microsoft.com/office/drawing/2014/main" id="{ED4B3528-1BC8-44F7-AD12-EDD6DB72FCD9}"/>
               </a:ext>
             </a:extLst>
           </p:cNvPr>
@@ -1957,7 +1961,7 @@
           <p:cNvPr id="3" name="Date Placeholder 2">
             <a:extLst>
               <a:ext uri="{FF2B5EF4-FFF2-40B4-BE49-F238E27FC236}">
-                <a16:creationId xmlns:a16="http://schemas.microsoft.com/office/drawing/2014/main" id="{AAFBBD8A-FEFA-4321-A99E-9E5D6BDD2B40}"/>
+                <a16:creationId xmlns:a16="http://schemas.microsoft.com/office/drawing/2014/main" id="{14385F2A-5B91-42A8-AD1C-66CE79EF2CB7}"/>
               </a:ext>
             </a:extLst>
           </p:cNvPr>
@@ -1973,9 +1977,9 @@
           <a:bodyPr/>
           <a:lstStyle/>
           <a:p>
-            <a:fld id="{E4D7F0DB-FBA8-467D-BC26-345BCD8F00EC}" type="datetimeFigureOut">
+            <a:fld id="{4880C7B9-F6E0-4938-B097-2C8B5620FE66}" type="datetimeFigureOut">
               <a:rPr lang="hu-HU" smtClean="0"/>
-              <a:t>2017.08.03.</a:t>
+              <a:t>2017.08.07.</a:t>
             </a:fld>
             <a:endParaRPr lang="hu-HU"/>
           </a:p>
@@ -1986,7 +1990,7 @@
           <p:cNvPr id="4" name="Footer Placeholder 3">
             <a:extLst>
               <a:ext uri="{FF2B5EF4-FFF2-40B4-BE49-F238E27FC236}">
-                <a16:creationId xmlns:a16="http://schemas.microsoft.com/office/drawing/2014/main" id="{FCDA8CC1-FA8F-44DB-BC6E-B7DDC80FACAF}"/>
+                <a16:creationId xmlns:a16="http://schemas.microsoft.com/office/drawing/2014/main" id="{EA002A54-4AED-44AE-9D57-309A2E42E577}"/>
               </a:ext>
             </a:extLst>
           </p:cNvPr>
@@ -2011,7 +2015,7 @@
           <p:cNvPr id="5" name="Slide Number Placeholder 4">
             <a:extLst>
               <a:ext uri="{FF2B5EF4-FFF2-40B4-BE49-F238E27FC236}">
-                <a16:creationId xmlns:a16="http://schemas.microsoft.com/office/drawing/2014/main" id="{D86E1730-F94A-4B89-BB84-FA79A71803AB}"/>
+                <a16:creationId xmlns:a16="http://schemas.microsoft.com/office/drawing/2014/main" id="{A157FC73-64C9-48FE-8728-448241A32780}"/>
               </a:ext>
             </a:extLst>
           </p:cNvPr>
@@ -2027,7 +2031,7 @@
           <a:bodyPr/>
           <a:lstStyle/>
           <a:p>
-            <a:fld id="{68EB2A7A-4083-4E15-8773-25D9DE2EC004}" type="slidenum">
+            <a:fld id="{96F39F47-D75B-476C-BE19-C7475061343E}" type="slidenum">
               <a:rPr lang="hu-HU" smtClean="0"/>
               <a:t>‹#›</a:t>
             </a:fld>
@@ -2038,7 +2042,7 @@
     </p:spTree>
     <p:extLst>
       <p:ext uri="{BB962C8B-B14F-4D97-AF65-F5344CB8AC3E}">
-        <p14:creationId xmlns:p14="http://schemas.microsoft.com/office/powerpoint/2010/main" val="91982943"/>
+        <p14:creationId xmlns:p14="http://schemas.microsoft.com/office/powerpoint/2010/main" val="2732560365"/>
       </p:ext>
     </p:extLst>
   </p:cSld>
@@ -2070,7 +2074,7 @@
           <p:cNvPr id="2" name="Date Placeholder 1">
             <a:extLst>
               <a:ext uri="{FF2B5EF4-FFF2-40B4-BE49-F238E27FC236}">
-                <a16:creationId xmlns:a16="http://schemas.microsoft.com/office/drawing/2014/main" id="{505AC810-A9B9-43DA-A55F-1A716FCF44D1}"/>
+                <a16:creationId xmlns:a16="http://schemas.microsoft.com/office/drawing/2014/main" id="{8882F205-5C5B-433A-B79B-8FE203320CE4}"/>
               </a:ext>
             </a:extLst>
           </p:cNvPr>
@@ -2086,9 +2090,9 @@
           <a:bodyPr/>
           <a:lstStyle/>
           <a:p>
-            <a:fld id="{E4D7F0DB-FBA8-467D-BC26-345BCD8F00EC}" type="datetimeFigureOut">
+            <a:fld id="{4880C7B9-F6E0-4938-B097-2C8B5620FE66}" type="datetimeFigureOut">
               <a:rPr lang="hu-HU" smtClean="0"/>
-              <a:t>2017.08.03.</a:t>
+              <a:t>2017.08.07.</a:t>
             </a:fld>
             <a:endParaRPr lang="hu-HU"/>
           </a:p>
@@ -2099,7 +2103,7 @@
           <p:cNvPr id="3" name="Footer Placeholder 2">
             <a:extLst>
               <a:ext uri="{FF2B5EF4-FFF2-40B4-BE49-F238E27FC236}">
-                <a16:creationId xmlns:a16="http://schemas.microsoft.com/office/drawing/2014/main" id="{1A9965FC-F67F-4D22-A4FD-DD500E84B59F}"/>
+                <a16:creationId xmlns:a16="http://schemas.microsoft.com/office/drawing/2014/main" id="{D8724F3C-D768-4BD2-8AC6-71D09C93745C}"/>
               </a:ext>
             </a:extLst>
           </p:cNvPr>
@@ -2124,7 +2128,7 @@
           <p:cNvPr id="4" name="Slide Number Placeholder 3">
             <a:extLst>
               <a:ext uri="{FF2B5EF4-FFF2-40B4-BE49-F238E27FC236}">
-                <a16:creationId xmlns:a16="http://schemas.microsoft.com/office/drawing/2014/main" id="{9627724F-760A-4BCC-A0B1-1F77196C46AD}"/>
+                <a16:creationId xmlns:a16="http://schemas.microsoft.com/office/drawing/2014/main" id="{012D5E56-09D0-4422-878D-E88A4737A1A5}"/>
               </a:ext>
             </a:extLst>
           </p:cNvPr>
@@ -2140,7 +2144,7 @@
           <a:bodyPr/>
           <a:lstStyle/>
           <a:p>
-            <a:fld id="{68EB2A7A-4083-4E15-8773-25D9DE2EC004}" type="slidenum">
+            <a:fld id="{96F39F47-D75B-476C-BE19-C7475061343E}" type="slidenum">
               <a:rPr lang="hu-HU" smtClean="0"/>
               <a:t>‹#›</a:t>
             </a:fld>
@@ -2151,7 +2155,7 @@
     </p:spTree>
     <p:extLst>
       <p:ext uri="{BB962C8B-B14F-4D97-AF65-F5344CB8AC3E}">
-        <p14:creationId xmlns:p14="http://schemas.microsoft.com/office/powerpoint/2010/main" val="2364996986"/>
+        <p14:creationId xmlns:p14="http://schemas.microsoft.com/office/powerpoint/2010/main" val="3231522650"/>
       </p:ext>
     </p:extLst>
   </p:cSld>
@@ -2183,7 +2187,7 @@
           <p:cNvPr id="2" name="Title 1">
             <a:extLst>
               <a:ext uri="{FF2B5EF4-FFF2-40B4-BE49-F238E27FC236}">
-                <a16:creationId xmlns:a16="http://schemas.microsoft.com/office/drawing/2014/main" id="{97F87877-AF9D-4D3B-BAB4-F0108B9AFD54}"/>
+                <a16:creationId xmlns:a16="http://schemas.microsoft.com/office/drawing/2014/main" id="{330E2635-9B60-410D-9167-D62E9FDEF340}"/>
               </a:ext>
             </a:extLst>
           </p:cNvPr>
@@ -2221,7 +2225,7 @@
           <p:cNvPr id="3" name="Content Placeholder 2">
             <a:extLst>
               <a:ext uri="{FF2B5EF4-FFF2-40B4-BE49-F238E27FC236}">
-                <a16:creationId xmlns:a16="http://schemas.microsoft.com/office/drawing/2014/main" id="{168FC945-AAF4-4553-8DAC-52ABE1E42584}"/>
+                <a16:creationId xmlns:a16="http://schemas.microsoft.com/office/drawing/2014/main" id="{464D56FD-366E-4B3C-AB8C-AB4BF15837EF}"/>
               </a:ext>
             </a:extLst>
           </p:cNvPr>
@@ -2312,7 +2316,7 @@
           <p:cNvPr id="4" name="Text Placeholder 3">
             <a:extLst>
               <a:ext uri="{FF2B5EF4-FFF2-40B4-BE49-F238E27FC236}">
-                <a16:creationId xmlns:a16="http://schemas.microsoft.com/office/drawing/2014/main" id="{91A0EF06-7716-4CBF-8E6E-5E80D0B46545}"/>
+                <a16:creationId xmlns:a16="http://schemas.microsoft.com/office/drawing/2014/main" id="{7F40F696-20A5-483A-8D71-3A194CE89327}"/>
               </a:ext>
             </a:extLst>
           </p:cNvPr>
@@ -2383,7 +2387,7 @@
           <p:cNvPr id="5" name="Date Placeholder 4">
             <a:extLst>
               <a:ext uri="{FF2B5EF4-FFF2-40B4-BE49-F238E27FC236}">
-                <a16:creationId xmlns:a16="http://schemas.microsoft.com/office/drawing/2014/main" id="{7D90CF38-37EB-4FBA-B13C-67A29C04D86C}"/>
+                <a16:creationId xmlns:a16="http://schemas.microsoft.com/office/drawing/2014/main" id="{F4628F96-9CAC-45E9-89D1-7485F0993195}"/>
               </a:ext>
             </a:extLst>
           </p:cNvPr>
@@ -2399,9 +2403,9 @@
           <a:bodyPr/>
           <a:lstStyle/>
           <a:p>
-            <a:fld id="{E4D7F0DB-FBA8-467D-BC26-345BCD8F00EC}" type="datetimeFigureOut">
+            <a:fld id="{4880C7B9-F6E0-4938-B097-2C8B5620FE66}" type="datetimeFigureOut">
               <a:rPr lang="hu-HU" smtClean="0"/>
-              <a:t>2017.08.03.</a:t>
+              <a:t>2017.08.07.</a:t>
             </a:fld>
             <a:endParaRPr lang="hu-HU"/>
           </a:p>
@@ -2412,7 +2416,7 @@
           <p:cNvPr id="6" name="Footer Placeholder 5">
             <a:extLst>
               <a:ext uri="{FF2B5EF4-FFF2-40B4-BE49-F238E27FC236}">
-                <a16:creationId xmlns:a16="http://schemas.microsoft.com/office/drawing/2014/main" id="{A5A20C1E-D22A-47A5-B2C4-201C0A21B0D8}"/>
+                <a16:creationId xmlns:a16="http://schemas.microsoft.com/office/drawing/2014/main" id="{4C479545-DFF5-489F-B4C7-41E7FF509D7D}"/>
               </a:ext>
             </a:extLst>
           </p:cNvPr>
@@ -2437,7 +2441,7 @@
           <p:cNvPr id="7" name="Slide Number Placeholder 6">
             <a:extLst>
               <a:ext uri="{FF2B5EF4-FFF2-40B4-BE49-F238E27FC236}">
-                <a16:creationId xmlns:a16="http://schemas.microsoft.com/office/drawing/2014/main" id="{99F1E79D-B7DC-4548-8DE1-DD88C5143B0F}"/>
+                <a16:creationId xmlns:a16="http://schemas.microsoft.com/office/drawing/2014/main" id="{92D64036-52C0-4934-9E99-AC90881E49A4}"/>
               </a:ext>
             </a:extLst>
           </p:cNvPr>
@@ -2453,7 +2457,7 @@
           <a:bodyPr/>
           <a:lstStyle/>
           <a:p>
-            <a:fld id="{68EB2A7A-4083-4E15-8773-25D9DE2EC004}" type="slidenum">
+            <a:fld id="{96F39F47-D75B-476C-BE19-C7475061343E}" type="slidenum">
               <a:rPr lang="hu-HU" smtClean="0"/>
               <a:t>‹#›</a:t>
             </a:fld>
@@ -2464,7 +2468,7 @@
     </p:spTree>
     <p:extLst>
       <p:ext uri="{BB962C8B-B14F-4D97-AF65-F5344CB8AC3E}">
-        <p14:creationId xmlns:p14="http://schemas.microsoft.com/office/powerpoint/2010/main" val="2620691386"/>
+        <p14:creationId xmlns:p14="http://schemas.microsoft.com/office/powerpoint/2010/main" val="3643527572"/>
       </p:ext>
     </p:extLst>
   </p:cSld>
@@ -2496,7 +2500,7 @@
           <p:cNvPr id="2" name="Title 1">
             <a:extLst>
               <a:ext uri="{FF2B5EF4-FFF2-40B4-BE49-F238E27FC236}">
-                <a16:creationId xmlns:a16="http://schemas.microsoft.com/office/drawing/2014/main" id="{876A73D7-9AE9-4443-AAAC-3E0BE52CB903}"/>
+                <a16:creationId xmlns:a16="http://schemas.microsoft.com/office/drawing/2014/main" id="{1AA8C81C-3D7C-4A7D-8ECE-29A68D99F97F}"/>
               </a:ext>
             </a:extLst>
           </p:cNvPr>
@@ -2534,7 +2538,7 @@
           <p:cNvPr id="3" name="Picture Placeholder 2">
             <a:extLst>
               <a:ext uri="{FF2B5EF4-FFF2-40B4-BE49-F238E27FC236}">
-                <a16:creationId xmlns:a16="http://schemas.microsoft.com/office/drawing/2014/main" id="{99476CE4-B21E-488C-98B5-904304FCEDF6}"/>
+                <a16:creationId xmlns:a16="http://schemas.microsoft.com/office/drawing/2014/main" id="{B0CE96FC-6317-4EE3-A0B7-535E6B5C4998}"/>
               </a:ext>
             </a:extLst>
           </p:cNvPr>
@@ -2601,7 +2605,7 @@
           <p:cNvPr id="4" name="Text Placeholder 3">
             <a:extLst>
               <a:ext uri="{FF2B5EF4-FFF2-40B4-BE49-F238E27FC236}">
-                <a16:creationId xmlns:a16="http://schemas.microsoft.com/office/drawing/2014/main" id="{B9C88961-4C24-45A9-9C35-ACBC2C60415C}"/>
+                <a16:creationId xmlns:a16="http://schemas.microsoft.com/office/drawing/2014/main" id="{C8A3B179-9491-4D02-B1FE-6BF012C52514}"/>
               </a:ext>
             </a:extLst>
           </p:cNvPr>
@@ -2672,7 +2676,7 @@
           <p:cNvPr id="5" name="Date Placeholder 4">
             <a:extLst>
               <a:ext uri="{FF2B5EF4-FFF2-40B4-BE49-F238E27FC236}">
-                <a16:creationId xmlns:a16="http://schemas.microsoft.com/office/drawing/2014/main" id="{C20477E8-464B-4BA9-AA55-77815F10C9F3}"/>
+                <a16:creationId xmlns:a16="http://schemas.microsoft.com/office/drawing/2014/main" id="{5A06D824-6129-4C79-8CA7-2BF86B248A36}"/>
               </a:ext>
             </a:extLst>
           </p:cNvPr>
@@ -2688,9 +2692,9 @@
           <a:bodyPr/>
           <a:lstStyle/>
           <a:p>
-            <a:fld id="{E4D7F0DB-FBA8-467D-BC26-345BCD8F00EC}" type="datetimeFigureOut">
+            <a:fld id="{4880C7B9-F6E0-4938-B097-2C8B5620FE66}" type="datetimeFigureOut">
               <a:rPr lang="hu-HU" smtClean="0"/>
-              <a:t>2017.08.03.</a:t>
+              <a:t>2017.08.07.</a:t>
             </a:fld>
             <a:endParaRPr lang="hu-HU"/>
           </a:p>
@@ -2701,7 +2705,7 @@
           <p:cNvPr id="6" name="Footer Placeholder 5">
             <a:extLst>
               <a:ext uri="{FF2B5EF4-FFF2-40B4-BE49-F238E27FC236}">
-                <a16:creationId xmlns:a16="http://schemas.microsoft.com/office/drawing/2014/main" id="{36E7BC9B-AEF6-4C0B-9616-B2B20856463B}"/>
+                <a16:creationId xmlns:a16="http://schemas.microsoft.com/office/drawing/2014/main" id="{FC253655-99C6-4A0E-A4E2-72BEF40D51C5}"/>
               </a:ext>
             </a:extLst>
           </p:cNvPr>
@@ -2726,7 +2730,7 @@
           <p:cNvPr id="7" name="Slide Number Placeholder 6">
             <a:extLst>
               <a:ext uri="{FF2B5EF4-FFF2-40B4-BE49-F238E27FC236}">
-                <a16:creationId xmlns:a16="http://schemas.microsoft.com/office/drawing/2014/main" id="{E6C0D078-E121-4A6B-963B-5D5E1B5324E5}"/>
+                <a16:creationId xmlns:a16="http://schemas.microsoft.com/office/drawing/2014/main" id="{78646872-7702-4F0B-9458-C123C2B0C274}"/>
               </a:ext>
             </a:extLst>
           </p:cNvPr>
@@ -2742,7 +2746,7 @@
           <a:bodyPr/>
           <a:lstStyle/>
           <a:p>
-            <a:fld id="{68EB2A7A-4083-4E15-8773-25D9DE2EC004}" type="slidenum">
+            <a:fld id="{96F39F47-D75B-476C-BE19-C7475061343E}" type="slidenum">
               <a:rPr lang="hu-HU" smtClean="0"/>
               <a:t>‹#›</a:t>
             </a:fld>
@@ -2753,7 +2757,7 @@
     </p:spTree>
     <p:extLst>
       <p:ext uri="{BB962C8B-B14F-4D97-AF65-F5344CB8AC3E}">
-        <p14:creationId xmlns:p14="http://schemas.microsoft.com/office/powerpoint/2010/main" val="846735935"/>
+        <p14:creationId xmlns:p14="http://schemas.microsoft.com/office/powerpoint/2010/main" val="3902842465"/>
       </p:ext>
     </p:extLst>
   </p:cSld>
@@ -2790,7 +2794,7 @@
           <p:cNvPr id="2" name="Title Placeholder 1">
             <a:extLst>
               <a:ext uri="{FF2B5EF4-FFF2-40B4-BE49-F238E27FC236}">
-                <a16:creationId xmlns:a16="http://schemas.microsoft.com/office/drawing/2014/main" id="{7593B830-082F-4D91-9E73-0FDE42609569}"/>
+                <a16:creationId xmlns:a16="http://schemas.microsoft.com/office/drawing/2014/main" id="{D6E61B32-5432-4E81-BAFE-1F02F40389D6}"/>
               </a:ext>
             </a:extLst>
           </p:cNvPr>
@@ -2829,7 +2833,7 @@
           <p:cNvPr id="3" name="Text Placeholder 2">
             <a:extLst>
               <a:ext uri="{FF2B5EF4-FFF2-40B4-BE49-F238E27FC236}">
-                <a16:creationId xmlns:a16="http://schemas.microsoft.com/office/drawing/2014/main" id="{9FF0725C-F705-4911-B2E7-40634EFA379A}"/>
+                <a16:creationId xmlns:a16="http://schemas.microsoft.com/office/drawing/2014/main" id="{F5EEACE2-A239-4CDE-A6B1-FC32B1BBA32B}"/>
               </a:ext>
             </a:extLst>
           </p:cNvPr>
@@ -2897,7 +2901,7 @@
           <p:cNvPr id="4" name="Date Placeholder 3">
             <a:extLst>
               <a:ext uri="{FF2B5EF4-FFF2-40B4-BE49-F238E27FC236}">
-                <a16:creationId xmlns:a16="http://schemas.microsoft.com/office/drawing/2014/main" id="{59D8A4C7-BFA0-4DC7-9ACC-29DA1D336C9E}"/>
+                <a16:creationId xmlns:a16="http://schemas.microsoft.com/office/drawing/2014/main" id="{28A28E98-452D-4541-B057-D57B4901C262}"/>
               </a:ext>
             </a:extLst>
           </p:cNvPr>
@@ -2931,9 +2935,9 @@
             </a:lvl1pPr>
           </a:lstStyle>
           <a:p>
-            <a:fld id="{E4D7F0DB-FBA8-467D-BC26-345BCD8F00EC}" type="datetimeFigureOut">
+            <a:fld id="{4880C7B9-F6E0-4938-B097-2C8B5620FE66}" type="datetimeFigureOut">
               <a:rPr lang="hu-HU" smtClean="0"/>
-              <a:t>2017.08.03.</a:t>
+              <a:t>2017.08.07.</a:t>
             </a:fld>
             <a:endParaRPr lang="hu-HU"/>
           </a:p>
@@ -2944,7 +2948,7 @@
           <p:cNvPr id="5" name="Footer Placeholder 4">
             <a:extLst>
               <a:ext uri="{FF2B5EF4-FFF2-40B4-BE49-F238E27FC236}">
-                <a16:creationId xmlns:a16="http://schemas.microsoft.com/office/drawing/2014/main" id="{230CD72C-CFDB-49C2-A468-579C20EB59FD}"/>
+                <a16:creationId xmlns:a16="http://schemas.microsoft.com/office/drawing/2014/main" id="{ABE82064-AF0F-4B2E-A531-C49397CC51A8}"/>
               </a:ext>
             </a:extLst>
           </p:cNvPr>
@@ -2987,7 +2991,7 @@
           <p:cNvPr id="6" name="Slide Number Placeholder 5">
             <a:extLst>
               <a:ext uri="{FF2B5EF4-FFF2-40B4-BE49-F238E27FC236}">
-                <a16:creationId xmlns:a16="http://schemas.microsoft.com/office/drawing/2014/main" id="{1E77F04E-1173-478A-9D15-635208E36BED}"/>
+                <a16:creationId xmlns:a16="http://schemas.microsoft.com/office/drawing/2014/main" id="{4FE0D6BF-0177-40AF-BB43-18199C08B777}"/>
               </a:ext>
             </a:extLst>
           </p:cNvPr>
@@ -3021,7 +3025,7 @@
             </a:lvl1pPr>
           </a:lstStyle>
           <a:p>
-            <a:fld id="{68EB2A7A-4083-4E15-8773-25D9DE2EC004}" type="slidenum">
+            <a:fld id="{96F39F47-D75B-476C-BE19-C7475061343E}" type="slidenum">
               <a:rPr lang="hu-HU" smtClean="0"/>
               <a:t>‹#›</a:t>
             </a:fld>
@@ -3032,7 +3036,7 @@
     </p:spTree>
     <p:extLst>
       <p:ext uri="{BB962C8B-B14F-4D97-AF65-F5344CB8AC3E}">
-        <p14:creationId xmlns:p14="http://schemas.microsoft.com/office/powerpoint/2010/main" val="2434325120"/>
+        <p14:creationId xmlns:p14="http://schemas.microsoft.com/office/powerpoint/2010/main" val="2681439589"/>
       </p:ext>
     </p:extLst>
   </p:cSld>
@@ -3354,16 +3358,16 @@
     <p:controls>
       <mc:AlternateContent xmlns:mc="http://schemas.openxmlformats.org/markup-compatibility/2006">
         <mc:Choice xmlns:v="urn:schemas-microsoft-com:vml" Requires="v">
-          <p:control spid="1026" name="CheckBox1" r:id="rId2" imgW="3619440" imgH="1352520"/>
+          <p:control spid="1031" name="CheckBox1" r:id="rId2" imgW="2685960" imgH="923760"/>
         </mc:Choice>
         <mc:Fallback>
-          <p:control name="CheckBox1" r:id="rId2" imgW="3619440" imgH="1352520">
+          <p:control name="CheckBox1" r:id="rId2" imgW="2685960" imgH="923760">
             <p:pic>
               <p:nvPicPr>
-                <p:cNvPr id="4" name="CheckBox1">
+                <p:cNvPr id="5" name="CheckBox1">
                   <a:extLst>
                     <a:ext uri="{FF2B5EF4-FFF2-40B4-BE49-F238E27FC236}">
-                      <a16:creationId xmlns:a16="http://schemas.microsoft.com/office/drawing/2014/main" id="{8617D216-C6DD-4964-A96E-D745C555870B}"/>
+                      <a16:creationId xmlns:a16="http://schemas.microsoft.com/office/drawing/2014/main" id="{5727F81A-B501-4567-8356-CBBB6500AECD}"/>
                     </a:ext>
                   </a:extLst>
                 </p:cNvPr>
@@ -3373,15 +3377,93 @@
                 <p:nvPr/>
               </p:nvPicPr>
               <p:blipFill>
-                <a:blip r:embed="rId4"/>
+                <a:blip r:embed="rId6"/>
                 <a:stretch>
                   <a:fillRect/>
                 </a:stretch>
               </p:blipFill>
               <p:spPr>
                 <a:xfrm>
-                  <a:off x="1511300" y="1285875"/>
-                  <a:ext cx="3617913" cy="1350963"/>
+                  <a:off x="1524000" y="1789113"/>
+                  <a:ext cx="2690191" cy="927100"/>
+                </a:xfrm>
+                <a:prstGeom prst="rect">
+                  <a:avLst/>
+                </a:prstGeom>
+              </p:spPr>
+            </p:pic>
+          </p:control>
+        </mc:Fallback>
+      </mc:AlternateContent>
+      <mc:AlternateContent xmlns:mc="http://schemas.openxmlformats.org/markup-compatibility/2006">
+        <mc:Choice xmlns:v="urn:schemas-microsoft-com:vml" Requires="v">
+          <p:control spid="1032" name="CheckBox2" r:id="rId3" imgW="2685960" imgH="923760"/>
+        </mc:Choice>
+        <mc:Fallback>
+          <p:control name="CheckBox2" r:id="rId3" imgW="2685960" imgH="923760">
+            <p:pic>
+              <p:nvPicPr>
+                <p:cNvPr id="7" name="CheckBox2">
+                  <a:extLst>
+                    <a:ext uri="{FF2B5EF4-FFF2-40B4-BE49-F238E27FC236}">
+                      <a16:creationId xmlns:a16="http://schemas.microsoft.com/office/drawing/2014/main" id="{DEF77AC4-C72F-43B9-9D9A-587D94C0500F}"/>
+                    </a:ext>
+                  </a:extLst>
+                </p:cNvPr>
+                <p:cNvPicPr>
+                  <a:picLocks/>
+                </p:cNvPicPr>
+                <p:nvPr/>
+              </p:nvPicPr>
+              <p:blipFill>
+                <a:blip r:embed="rId7"/>
+                <a:stretch>
+                  <a:fillRect/>
+                </a:stretch>
+              </p:blipFill>
+              <p:spPr>
+                <a:xfrm>
+                  <a:off x="3889513" y="1789113"/>
+                  <a:ext cx="2690191" cy="927100"/>
+                </a:xfrm>
+                <a:prstGeom prst="rect">
+                  <a:avLst/>
+                </a:prstGeom>
+              </p:spPr>
+            </p:pic>
+          </p:control>
+        </mc:Fallback>
+      </mc:AlternateContent>
+      <mc:AlternateContent xmlns:mc="http://schemas.openxmlformats.org/markup-compatibility/2006">
+        <mc:Choice xmlns:v="urn:schemas-microsoft-com:vml" Requires="v">
+          <p:control spid="1033" name="CheckBox3" r:id="rId4" imgW="2685960" imgH="923760"/>
+        </mc:Choice>
+        <mc:Fallback>
+          <p:control name="CheckBox3" r:id="rId4" imgW="2685960" imgH="923760">
+            <p:pic>
+              <p:nvPicPr>
+                <p:cNvPr id="8" name="CheckBox3">
+                  <a:extLst>
+                    <a:ext uri="{FF2B5EF4-FFF2-40B4-BE49-F238E27FC236}">
+                      <a16:creationId xmlns:a16="http://schemas.microsoft.com/office/drawing/2014/main" id="{3083CBA5-0CF8-4609-B4A2-5FF781A13AC2}"/>
+                    </a:ext>
+                  </a:extLst>
+                </p:cNvPr>
+                <p:cNvPicPr>
+                  <a:picLocks/>
+                </p:cNvPicPr>
+                <p:nvPr/>
+              </p:nvPicPr>
+              <p:blipFill>
+                <a:blip r:embed="rId8"/>
+                <a:stretch>
+                  <a:fillRect/>
+                </a:stretch>
+              </p:blipFill>
+              <p:spPr>
+                <a:xfrm>
+                  <a:off x="7050157" y="1789113"/>
+                  <a:ext cx="2690191" cy="927100"/>
                 </a:xfrm>
                 <a:prstGeom prst="rect">
                   <a:avLst/>
@@ -3394,7 +3476,7 @@
     </p:controls>
     <p:extLst>
       <p:ext uri="{BB962C8B-B14F-4D97-AF65-F5344CB8AC3E}">
-        <p14:creationId xmlns:p14="http://schemas.microsoft.com/office/powerpoint/2010/main" val="2596248773"/>
+        <p14:creationId xmlns:p14="http://schemas.microsoft.com/office/powerpoint/2010/main" val="2056020516"/>
       </p:ext>
     </p:extLst>
   </p:cSld>

</xml_diff>